<commit_message>
Project on 8 puzzle
</commit_message>
<xml_diff>
--- a/8puzzle_presentation.pptx
+++ b/8puzzle_presentation.pptx
@@ -330,7 +330,7 @@
             <a:fld id="{B61BEF0D-F0BB-DE4B-95CE-6DB70DBA9567}" type="datetimeFigureOut">
               <a:rPr lang="en-US" dirty="0"/>
               <a:pPr/>
-              <a:t>9/20/2019</a:t>
+              <a:t>8/1/2021</a:t>
             </a:fld>
             <a:endParaRPr lang="en-US" dirty="0"/>
           </a:p>
@@ -665,7 +665,7 @@
             <a:fld id="{B61BEF0D-F0BB-DE4B-95CE-6DB70DBA9567}" type="datetimeFigureOut">
               <a:rPr lang="en-US" dirty="0"/>
               <a:pPr/>
-              <a:t>9/20/2019</a:t>
+              <a:t>8/1/2021</a:t>
             </a:fld>
             <a:endParaRPr lang="en-US" dirty="0"/>
           </a:p>
@@ -1063,7 +1063,7 @@
             <a:fld id="{B61BEF0D-F0BB-DE4B-95CE-6DB70DBA9567}" type="datetimeFigureOut">
               <a:rPr lang="en-US" dirty="0"/>
               <a:pPr/>
-              <a:t>9/20/2019</a:t>
+              <a:t>8/1/2021</a:t>
             </a:fld>
             <a:endParaRPr lang="en-US" dirty="0"/>
           </a:p>
@@ -1395,7 +1395,7 @@
             <a:fld id="{B61BEF0D-F0BB-DE4B-95CE-6DB70DBA9567}" type="datetimeFigureOut">
               <a:rPr lang="en-US" dirty="0"/>
               <a:pPr/>
-              <a:t>9/20/2019</a:t>
+              <a:t>8/1/2021</a:t>
             </a:fld>
             <a:endParaRPr lang="en-US" dirty="0"/>
           </a:p>
@@ -1712,7 +1712,7 @@
             <a:fld id="{B61BEF0D-F0BB-DE4B-95CE-6DB70DBA9567}" type="datetimeFigureOut">
               <a:rPr lang="en-US" dirty="0"/>
               <a:pPr/>
-              <a:t>9/20/2019</a:t>
+              <a:t>8/1/2021</a:t>
             </a:fld>
             <a:endParaRPr lang="en-US" dirty="0"/>
           </a:p>
@@ -2105,7 +2105,7 @@
             <a:fld id="{B61BEF0D-F0BB-DE4B-95CE-6DB70DBA9567}" type="datetimeFigureOut">
               <a:rPr lang="en-US" dirty="0"/>
               <a:pPr/>
-              <a:t>9/20/2019</a:t>
+              <a:t>8/1/2021</a:t>
             </a:fld>
             <a:endParaRPr lang="en-US" dirty="0"/>
           </a:p>
@@ -2359,7 +2359,7 @@
             <a:fld id="{B61BEF0D-F0BB-DE4B-95CE-6DB70DBA9567}" type="datetimeFigureOut">
               <a:rPr lang="en-US" dirty="0"/>
               <a:pPr/>
-              <a:t>9/20/2019</a:t>
+              <a:t>8/1/2021</a:t>
             </a:fld>
             <a:endParaRPr lang="en-US" dirty="0"/>
           </a:p>
@@ -2618,7 +2618,7 @@
             <a:fld id="{B61BEF0D-F0BB-DE4B-95CE-6DB70DBA9567}" type="datetimeFigureOut">
               <a:rPr lang="en-US" dirty="0"/>
               <a:pPr/>
-              <a:t>9/20/2019</a:t>
+              <a:t>8/1/2021</a:t>
             </a:fld>
             <a:endParaRPr lang="en-US" dirty="0"/>
           </a:p>
@@ -2877,7 +2877,7 @@
             <a:fld id="{B61BEF0D-F0BB-DE4B-95CE-6DB70DBA9567}" type="datetimeFigureOut">
               <a:rPr lang="en-US" dirty="0"/>
               <a:pPr/>
-              <a:t>9/20/2019</a:t>
+              <a:t>8/1/2021</a:t>
             </a:fld>
             <a:endParaRPr lang="en-US" dirty="0"/>
           </a:p>
@@ -3203,7 +3203,7 @@
             <a:fld id="{B61BEF0D-F0BB-DE4B-95CE-6DB70DBA9567}" type="datetimeFigureOut">
               <a:rPr lang="en-US" dirty="0"/>
               <a:pPr/>
-              <a:t>9/20/2019</a:t>
+              <a:t>8/1/2021</a:t>
             </a:fld>
             <a:endParaRPr lang="en-US" dirty="0"/>
           </a:p>
@@ -3523,7 +3523,7 @@
             <a:fld id="{B61BEF0D-F0BB-DE4B-95CE-6DB70DBA9567}" type="datetimeFigureOut">
               <a:rPr lang="en-US" dirty="0"/>
               <a:pPr/>
-              <a:t>9/20/2019</a:t>
+              <a:t>8/1/2021</a:t>
             </a:fld>
             <a:endParaRPr lang="en-US" dirty="0"/>
           </a:p>
@@ -3977,7 +3977,7 @@
             <a:fld id="{B61BEF0D-F0BB-DE4B-95CE-6DB70DBA9567}" type="datetimeFigureOut">
               <a:rPr lang="en-US" dirty="0"/>
               <a:pPr/>
-              <a:t>9/20/2019</a:t>
+              <a:t>8/1/2021</a:t>
             </a:fld>
             <a:endParaRPr lang="en-US" dirty="0"/>
           </a:p>
@@ -4179,7 +4179,7 @@
             <a:fld id="{B61BEF0D-F0BB-DE4B-95CE-6DB70DBA9567}" type="datetimeFigureOut">
               <a:rPr lang="en-US" dirty="0"/>
               <a:pPr/>
-              <a:t>9/20/2019</a:t>
+              <a:t>8/1/2021</a:t>
             </a:fld>
             <a:endParaRPr lang="en-US" dirty="0"/>
           </a:p>
@@ -4353,7 +4353,7 @@
             <a:fld id="{B61BEF0D-F0BB-DE4B-95CE-6DB70DBA9567}" type="datetimeFigureOut">
               <a:rPr lang="en-US" dirty="0"/>
               <a:pPr/>
-              <a:t>9/20/2019</a:t>
+              <a:t>8/1/2021</a:t>
             </a:fld>
             <a:endParaRPr lang="en-US" dirty="0"/>
           </a:p>
@@ -4683,7 +4683,7 @@
             <a:fld id="{B61BEF0D-F0BB-DE4B-95CE-6DB70DBA9567}" type="datetimeFigureOut">
               <a:rPr lang="en-US" dirty="0"/>
               <a:pPr/>
-              <a:t>9/20/2019</a:t>
+              <a:t>8/1/2021</a:t>
             </a:fld>
             <a:endParaRPr lang="en-US" dirty="0"/>
           </a:p>
@@ -5025,7 +5025,7 @@
             <a:fld id="{B61BEF0D-F0BB-DE4B-95CE-6DB70DBA9567}" type="datetimeFigureOut">
               <a:rPr lang="en-US" dirty="0"/>
               <a:pPr/>
-              <a:t>9/20/2019</a:t>
+              <a:t>8/1/2021</a:t>
             </a:fld>
             <a:endParaRPr lang="en-US" dirty="0"/>
           </a:p>
@@ -7139,7 +7139,7 @@
             <a:fld id="{B61BEF0D-F0BB-DE4B-95CE-6DB70DBA9567}" type="datetimeFigureOut">
               <a:rPr lang="en-US" dirty="0"/>
               <a:pPr/>
-              <a:t>9/20/2019</a:t>
+              <a:t>8/1/2021</a:t>
             </a:fld>
             <a:endParaRPr lang="en-US" dirty="0"/>
           </a:p>
@@ -7894,7 +7894,7 @@
         <p:spPr>
           <a:xfrm>
             <a:off x="8459150" y="5309250"/>
-            <a:ext cx="3649992" cy="1077218"/>
+            <a:ext cx="3649992" cy="584775"/>
           </a:xfrm>
           <a:prstGeom prst="rect">
             <a:avLst/>
@@ -7922,7 +7922,7 @@
                   </a:outerShdw>
                 </a:effectLst>
               </a:rPr>
-              <a:t>Rupam Bhattacharyya</a:t>
+              <a:t>BIPLAB PALAYE</a:t>
             </a:r>
           </a:p>
         </p:txBody>
@@ -16834,7 +16834,7 @@
         <p:spPr>
           <a:xfrm>
             <a:off x="2093296" y="1733339"/>
-            <a:ext cx="4791696" cy="3170099"/>
+            <a:ext cx="4094391" cy="1323439"/>
           </a:xfrm>
           <a:prstGeom prst="rect">
             <a:avLst/>
@@ -16866,106 +16866,7 @@
                   </a:outerShdw>
                 </a:effectLst>
               </a:rPr>
-              <a:t>Abhishek Kumar</a:t>
-            </a:r>
-            <a:endParaRPr lang="en-US" sz="4000" b="1" dirty="0">
-              <a:ln w="9525">
-                <a:solidFill>
-                  <a:schemeClr val="bg1"/>
-                </a:solidFill>
-                <a:prstDash val="solid"/>
-              </a:ln>
-              <a:effectLst>
-                <a:outerShdw blurRad="12700" dist="38100" dir="2700000" algn="tl" rotWithShape="0">
-                  <a:schemeClr val="bg1">
-                    <a:lumMod val="50000"/>
-                  </a:schemeClr>
-                </a:outerShdw>
-              </a:effectLst>
-            </a:endParaRPr>
-          </a:p>
-          <a:p>
-            <a:r>
-              <a:rPr lang="en-US" sz="4000" b="1" dirty="0">
-                <a:ln w="9525">
-                  <a:solidFill>
-                    <a:schemeClr val="bg1"/>
-                  </a:solidFill>
-                  <a:prstDash val="solid"/>
-                </a:ln>
-                <a:effectLst>
-                  <a:outerShdw blurRad="12700" dist="38100" dir="2700000" algn="tl" rotWithShape="0">
-                    <a:schemeClr val="bg1">
-                      <a:lumMod val="50000"/>
-                    </a:schemeClr>
-                  </a:outerShdw>
-                </a:effectLst>
-              </a:rPr>
-              <a:t>Himanshu Ranjan</a:t>
-            </a:r>
-          </a:p>
-          <a:p>
-            <a:r>
-              <a:rPr lang="en-US" sz="4000" b="1" cap="none" spc="0" dirty="0">
-                <a:ln w="9525">
-                  <a:solidFill>
-                    <a:schemeClr val="bg1"/>
-                  </a:solidFill>
-                  <a:prstDash val="solid"/>
-                </a:ln>
-                <a:solidFill>
-                  <a:schemeClr val="tx1"/>
-                </a:solidFill>
-                <a:effectLst>
-                  <a:outerShdw blurRad="12700" dist="38100" dir="2700000" algn="tl" rotWithShape="0">
-                    <a:schemeClr val="bg1">
-                      <a:lumMod val="50000"/>
-                    </a:schemeClr>
-                  </a:outerShdw>
-                </a:effectLst>
-              </a:rPr>
-              <a:t>Sura</a:t>
-            </a:r>
-            <a:r>
-              <a:rPr lang="en-US" sz="4000" b="1" dirty="0">
-                <a:ln w="9525">
-                  <a:solidFill>
-                    <a:schemeClr val="bg1"/>
-                  </a:solidFill>
-                  <a:prstDash val="solid"/>
-                </a:ln>
-                <a:effectLst>
-                  <a:outerShdw blurRad="12700" dist="38100" dir="2700000" algn="tl" rotWithShape="0">
-                    <a:schemeClr val="bg1">
-                      <a:lumMod val="50000"/>
-                    </a:schemeClr>
-                  </a:outerShdw>
-                </a:effectLst>
-              </a:rPr>
-              <a:t>j Kumar</a:t>
-            </a:r>
-          </a:p>
-          <a:p>
-            <a:r>
-              <a:rPr lang="en-US" sz="4000" b="1" cap="none" spc="0" dirty="0">
-                <a:ln w="9525">
-                  <a:solidFill>
-                    <a:schemeClr val="bg1"/>
-                  </a:solidFill>
-                  <a:prstDash val="solid"/>
-                </a:ln>
-                <a:solidFill>
-                  <a:schemeClr val="tx1"/>
-                </a:solidFill>
-                <a:effectLst>
-                  <a:outerShdw blurRad="12700" dist="38100" dir="2700000" algn="tl" rotWithShape="0">
-                    <a:schemeClr val="bg1">
-                      <a:lumMod val="50000"/>
-                    </a:schemeClr>
-                  </a:outerShdw>
-                </a:effectLst>
-              </a:rPr>
-              <a:t>Hitesh Kumar Sahu</a:t>
+              <a:t>ASHOK KUMAR</a:t>
             </a:r>
           </a:p>
           <a:p>
@@ -16985,7 +16886,7 @@
                   </a:outerShdw>
                 </a:effectLst>
               </a:rPr>
-              <a:t>Santosh Kumar</a:t>
+              <a:t>DIVYESH ANSHU</a:t>
             </a:r>
             <a:endParaRPr lang="en-US" sz="4000" b="1" cap="none" spc="0" dirty="0">
               <a:ln w="9525">

</xml_diff>